<commit_message>
Updated documentation and presentation
</commit_message>
<xml_diff>
--- a/doc/Presentation.pptx
+++ b/doc/Presentation.pptx
@@ -223,7 +223,7 @@
             <a:pPr rtl="0"/>
             <a:fld id="{960672BD-261C-4EDC-9C5E-C246835120E7}" type="datetime1">
               <a:rPr lang="de-DE" smtClean="0"/>
-              <a:t>06.04.2018</a:t>
+              <a:t>08.04.2018</a:t>
             </a:fld>
             <a:endParaRPr lang="de-DE" dirty="0"/>
           </a:p>
@@ -291,7 +291,7 @@
             <a:pPr rtl="0"/>
             <a:fld id="{7798501B-77B5-4365-9881-C6E19A3C1E42}" type="slidenum">
               <a:rPr lang="de-DE" smtClean="0"/>
-              <a:t>‹Nr.›</a:t>
+              <a:t>‹#›</a:t>
             </a:fld>
             <a:endParaRPr lang="de-DE" dirty="0"/>
           </a:p>
@@ -393,7 +393,7 @@
             <a:pPr rtl="0"/>
             <a:fld id="{6B5664F4-ABD2-4F09-9758-D36145E15169}" type="datetime1">
               <a:rPr lang="de-DE" smtClean="0"/>
-              <a:t>06.04.2018</a:t>
+              <a:t>08.04.2018</a:t>
             </a:fld>
             <a:endParaRPr lang="de-DE" dirty="0"/>
           </a:p>
@@ -554,7 +554,7 @@
             <a:pPr rtl="0"/>
             <a:fld id="{FC8BD8E7-1312-41F3-99C4-6DA5AF891969}" type="slidenum">
               <a:rPr lang="de-DE" smtClean="0"/>
-              <a:t>‹Nr.›</a:t>
+              <a:t>‹#›</a:t>
             </a:fld>
             <a:endParaRPr lang="de-DE" dirty="0"/>
           </a:p>
@@ -1879,7 +1879,7 @@
             <a:pPr rtl="0"/>
             <a:fld id="{6D86D372-411D-4B4E-9C3F-27EFF2F8BE1E}" type="datetime1">
               <a:rPr lang="de-DE" smtClean="0"/>
-              <a:t>06.04.2018</a:t>
+              <a:t>08.04.2018</a:t>
             </a:fld>
             <a:endParaRPr lang="de-DE" dirty="0"/>
           </a:p>
@@ -1903,7 +1903,7 @@
             <a:pPr rtl="0"/>
             <a:fld id="{E31375A4-56A4-47D6-9801-1991572033F7}" type="slidenum">
               <a:rPr lang="de-DE" smtClean="0"/>
-              <a:t>‹Nr.›</a:t>
+              <a:t>‹#›</a:t>
             </a:fld>
             <a:endParaRPr lang="de-DE" dirty="0"/>
           </a:p>
@@ -2086,7 +2086,7 @@
             <a:pPr rtl="0"/>
             <a:fld id="{E326EB1D-CBBF-438D-A188-239583155CD5}" type="datetime1">
               <a:rPr lang="de-DE" smtClean="0"/>
-              <a:t>06.04.2018</a:t>
+              <a:t>08.04.2018</a:t>
             </a:fld>
             <a:endParaRPr lang="de-DE" dirty="0"/>
           </a:p>
@@ -2110,7 +2110,7 @@
             <a:pPr rtl="0"/>
             <a:fld id="{E31375A4-56A4-47D6-9801-1991572033F7}" type="slidenum">
               <a:rPr lang="de-DE" smtClean="0"/>
-              <a:t>‹Nr.›</a:t>
+              <a:t>‹#›</a:t>
             </a:fld>
             <a:endParaRPr lang="de-DE" dirty="0"/>
           </a:p>
@@ -2696,7 +2696,7 @@
             <a:pPr rtl="0"/>
             <a:fld id="{0158FB9A-9055-4D91-A8D6-422B1A47ADD6}" type="datetime1">
               <a:rPr lang="de-DE" smtClean="0"/>
-              <a:t>06.04.2018</a:t>
+              <a:t>08.04.2018</a:t>
             </a:fld>
             <a:endParaRPr lang="de-DE" dirty="0"/>
           </a:p>
@@ -2720,7 +2720,7 @@
             <a:pPr rtl="0"/>
             <a:fld id="{E31375A4-56A4-47D6-9801-1991572033F7}" type="slidenum">
               <a:rPr lang="de-DE" smtClean="0"/>
-              <a:t>‹Nr.›</a:t>
+              <a:t>‹#›</a:t>
             </a:fld>
             <a:endParaRPr lang="de-DE" dirty="0"/>
           </a:p>
@@ -3219,7 +3219,7 @@
             <a:pPr rtl="0"/>
             <a:fld id="{F3AD2B2A-001E-4204-A9F7-ADB62FDFB3C2}" type="datetime1">
               <a:rPr lang="de-DE" smtClean="0"/>
-              <a:t>06.04.2018</a:t>
+              <a:t>08.04.2018</a:t>
             </a:fld>
             <a:endParaRPr lang="de-DE" dirty="0"/>
           </a:p>
@@ -3243,7 +3243,7 @@
             <a:pPr rtl="0"/>
             <a:fld id="{E31375A4-56A4-47D6-9801-1991572033F7}" type="slidenum">
               <a:rPr lang="de-DE" smtClean="0"/>
-              <a:t>‹Nr.›</a:t>
+              <a:t>‹#›</a:t>
             </a:fld>
             <a:endParaRPr lang="de-DE" dirty="0"/>
           </a:p>
@@ -3677,7 +3677,7 @@
             <a:pPr rtl="0"/>
             <a:fld id="{D0598511-F564-4313-9C85-1BB6BF3D8A32}" type="datetime1">
               <a:rPr lang="de-DE" smtClean="0"/>
-              <a:t>06.04.2018</a:t>
+              <a:t>08.04.2018</a:t>
             </a:fld>
             <a:endParaRPr lang="de-DE" dirty="0"/>
           </a:p>
@@ -3701,7 +3701,7 @@
             <a:pPr rtl="0"/>
             <a:fld id="{E31375A4-56A4-47D6-9801-1991572033F7}" type="slidenum">
               <a:rPr lang="de-DE" smtClean="0"/>
-              <a:t>‹Nr.›</a:t>
+              <a:t>‹#›</a:t>
             </a:fld>
             <a:endParaRPr lang="de-DE" dirty="0"/>
           </a:p>
@@ -3815,7 +3815,7 @@
             <a:pPr rtl="0"/>
             <a:fld id="{2E8B8011-CBA9-4FB0-934D-C2F23F0053DB}" type="datetime1">
               <a:rPr lang="de-DE" smtClean="0"/>
-              <a:t>06.04.2018</a:t>
+              <a:t>08.04.2018</a:t>
             </a:fld>
             <a:endParaRPr lang="de-DE" dirty="0"/>
           </a:p>
@@ -3839,7 +3839,7 @@
             <a:pPr rtl="0"/>
             <a:fld id="{E31375A4-56A4-47D6-9801-1991572033F7}" type="slidenum">
               <a:rPr lang="de-DE" smtClean="0"/>
-              <a:t>‹Nr.›</a:t>
+              <a:t>‹#›</a:t>
             </a:fld>
             <a:endParaRPr lang="de-DE" dirty="0"/>
           </a:p>
@@ -4161,7 +4161,7 @@
             <a:pPr rtl="0"/>
             <a:fld id="{62C0A95F-FFB2-4410-A448-2C54BE7723F4}" type="datetime1">
               <a:rPr lang="de-DE" smtClean="0"/>
-              <a:t>06.04.2018</a:t>
+              <a:t>08.04.2018</a:t>
             </a:fld>
             <a:endParaRPr lang="de-DE" dirty="0"/>
           </a:p>
@@ -4185,7 +4185,7 @@
             <a:pPr rtl="0"/>
             <a:fld id="{E31375A4-56A4-47D6-9801-1991572033F7}" type="slidenum">
               <a:rPr lang="de-DE" smtClean="0"/>
-              <a:t>‹Nr.›</a:t>
+              <a:t>‹#›</a:t>
             </a:fld>
             <a:endParaRPr lang="de-DE" dirty="0"/>
           </a:p>
@@ -4455,7 +4455,7 @@
             <a:pPr rtl="0"/>
             <a:fld id="{8C96ADC6-BDC4-42FB-97FB-DA73ECD9CEE8}" type="datetime1">
               <a:rPr lang="de-DE" smtClean="0"/>
-              <a:t>06.04.2018</a:t>
+              <a:t>08.04.2018</a:t>
             </a:fld>
             <a:endParaRPr lang="de-DE" dirty="0"/>
           </a:p>
@@ -4495,8 +4495,8 @@
             <a:pPr rtl="0"/>
             <a:fld id="{E31375A4-56A4-47D6-9801-1991572033F7}" type="slidenum">
               <a:rPr lang="de-DE" smtClean="0"/>
-              <a:pPr/>
-              <a:t>‹Nr.›</a:t>
+              <a:pPr rtl="0"/>
+              <a:t>‹#›</a:t>
             </a:fld>
             <a:endParaRPr lang="de-DE" dirty="0"/>
           </a:p>
@@ -5166,7 +5166,16 @@
           <a:bodyPr/>
           <a:lstStyle/>
           <a:p>
-            <a:endParaRPr lang="de-CH" dirty="0"/>
+            <a:r>
+              <a:rPr lang="de-CH" dirty="0"/>
+              <a:t>Soziale Phobie</a:t>
+            </a:r>
+          </a:p>
+          <a:p>
+            <a:r>
+              <a:rPr lang="de-CH" dirty="0"/>
+              <a:t>Nähere Angehörige</a:t>
+            </a:r>
           </a:p>
         </p:txBody>
       </p:sp>
@@ -5200,7 +5209,7 @@
         </p:blipFill>
         <p:spPr>
           <a:xfrm>
-            <a:off x="6172200" y="1716940"/>
+            <a:off x="5643693" y="1199084"/>
             <a:ext cx="5796150" cy="4459831"/>
           </a:xfrm>
         </p:spPr>
@@ -5370,7 +5379,28 @@
           <a:bodyPr rtlCol="0"/>
           <a:lstStyle/>
           <a:p>
-            <a:pPr rtl="0"/>
+            <a:r>
+              <a:rPr lang="de-CH" dirty="0"/>
+              <a:t>Als Vater will ich einen einfachen Weg das Verhalten des Patienten zu dokumentieren, damit der Arzt/Therapeut die Informationen benutzen kann, um die Behandlung entsprechend anzupassen.</a:t>
+            </a:r>
+          </a:p>
+          <a:p>
+            <a:r>
+              <a:rPr lang="de-CH" dirty="0"/>
+              <a:t>Als Vormund will ich Zugriff auf den Behandlungsverlauf des Patienten, damit ich weiss wie gut er sich entwickelt.</a:t>
+            </a:r>
+          </a:p>
+          <a:p>
+            <a:r>
+              <a:rPr lang="de-CH" dirty="0"/>
+              <a:t>Als Mutter will ich die verschriebenen Medikamente jeder Sitzung sehen, damit ich sicherstellen kann, dass der Patient diese auch benutzt.</a:t>
+            </a:r>
+          </a:p>
+          <a:p>
+            <a:r>
+              <a:rPr lang="de-CH" dirty="0"/>
+              <a:t>Als Angehöriger will ich die gesetzten Ziele zwischen dem Arzt/Therapeuten und dem Patienten sehen und in der Lage sein, eigene Ziele ins System einzutragen, damit der Arzt/Therapeut und ich diese, wenn nötig, anpassen und überprüfen können.</a:t>
+            </a:r>
             <a:endParaRPr lang="de-DE" dirty="0"/>
           </a:p>
         </p:txBody>

</xml_diff>

<commit_message>
Updated scope in presentation
</commit_message>
<xml_diff>
--- a/doc/Presentation.pptx
+++ b/doc/Presentation.pptx
@@ -5,20 +5,21 @@
     <p:sldMasterId id="2147483648" r:id="rId1"/>
   </p:sldMasterIdLst>
   <p:notesMasterIdLst>
-    <p:notesMasterId r:id="rId10"/>
+    <p:notesMasterId r:id="rId11"/>
   </p:notesMasterIdLst>
   <p:handoutMasterIdLst>
-    <p:handoutMasterId r:id="rId11"/>
+    <p:handoutMasterId r:id="rId12"/>
   </p:handoutMasterIdLst>
   <p:sldIdLst>
     <p:sldId id="262" r:id="rId2"/>
     <p:sldId id="257" r:id="rId3"/>
     <p:sldId id="280" r:id="rId4"/>
-    <p:sldId id="281" r:id="rId5"/>
-    <p:sldId id="282" r:id="rId6"/>
-    <p:sldId id="283" r:id="rId7"/>
-    <p:sldId id="284" r:id="rId8"/>
-    <p:sldId id="285" r:id="rId9"/>
+    <p:sldId id="286" r:id="rId5"/>
+    <p:sldId id="281" r:id="rId6"/>
+    <p:sldId id="282" r:id="rId7"/>
+    <p:sldId id="283" r:id="rId8"/>
+    <p:sldId id="284" r:id="rId9"/>
+    <p:sldId id="285" r:id="rId10"/>
   </p:sldIdLst>
   <p:sldSz cx="12192000" cy="6858000"/>
   <p:notesSz cx="6858000" cy="9144000"/>
@@ -994,7 +995,7 @@
     </p:spTree>
     <p:extLst>
       <p:ext uri="{BB962C8B-B14F-4D97-AF65-F5344CB8AC3E}">
-        <p14:creationId xmlns:p14="http://schemas.microsoft.com/office/powerpoint/2010/main" val="1483512787"/>
+        <p14:creationId xmlns:p14="http://schemas.microsoft.com/office/powerpoint/2010/main" val="1046904178"/>
       </p:ext>
     </p:extLst>
   </p:cSld>
@@ -1079,7 +1080,7 @@
     </p:spTree>
     <p:extLst>
       <p:ext uri="{BB962C8B-B14F-4D97-AF65-F5344CB8AC3E}">
-        <p14:creationId xmlns:p14="http://schemas.microsoft.com/office/powerpoint/2010/main" val="852829611"/>
+        <p14:creationId xmlns:p14="http://schemas.microsoft.com/office/powerpoint/2010/main" val="1483512787"/>
       </p:ext>
     </p:extLst>
   </p:cSld>
@@ -1164,7 +1165,7 @@
     </p:spTree>
     <p:extLst>
       <p:ext uri="{BB962C8B-B14F-4D97-AF65-F5344CB8AC3E}">
-        <p14:creationId xmlns:p14="http://schemas.microsoft.com/office/powerpoint/2010/main" val="2840546180"/>
+        <p14:creationId xmlns:p14="http://schemas.microsoft.com/office/powerpoint/2010/main" val="852829611"/>
       </p:ext>
     </p:extLst>
   </p:cSld>
@@ -1241,6 +1242,91 @@
             <a:fld id="{FC8BD8E7-1312-41F3-99C4-6DA5AF891969}" type="slidenum">
               <a:rPr lang="de-DE" smtClean="0"/>
               <a:t>7</a:t>
+            </a:fld>
+            <a:endParaRPr lang="de-DE" dirty="0"/>
+          </a:p>
+        </p:txBody>
+      </p:sp>
+    </p:spTree>
+    <p:extLst>
+      <p:ext uri="{BB962C8B-B14F-4D97-AF65-F5344CB8AC3E}">
+        <p14:creationId xmlns:p14="http://schemas.microsoft.com/office/powerpoint/2010/main" val="2840546180"/>
+      </p:ext>
+    </p:extLst>
+  </p:cSld>
+  <p:clrMapOvr>
+    <a:masterClrMapping/>
+  </p:clrMapOvr>
+</p:notes>
+</file>
+
+<file path=ppt/notesSlides/notesSlide8.xml><?xml version="1.0" encoding="utf-8"?>
+<p:notes xmlns:a="http://schemas.openxmlformats.org/drawingml/2006/main" xmlns:r="http://schemas.openxmlformats.org/officeDocument/2006/relationships" xmlns:p="http://schemas.openxmlformats.org/presentationml/2006/main">
+  <p:cSld>
+    <p:spTree>
+      <p:nvGrpSpPr>
+        <p:cNvPr id="1" name=""/>
+        <p:cNvGrpSpPr/>
+        <p:nvPr/>
+      </p:nvGrpSpPr>
+      <p:grpSpPr>
+        <a:xfrm>
+          <a:off x="0" y="0"/>
+          <a:ext cx="0" cy="0"/>
+          <a:chOff x="0" y="0"/>
+          <a:chExt cx="0" cy="0"/>
+        </a:xfrm>
+      </p:grpSpPr>
+      <p:sp>
+        <p:nvSpPr>
+          <p:cNvPr id="2" name="Folienbildplatzhalter 1"/>
+          <p:cNvSpPr>
+            <a:spLocks noGrp="1" noRot="1" noChangeAspect="1"/>
+          </p:cNvSpPr>
+          <p:nvPr>
+            <p:ph type="sldImg"/>
+          </p:nvPr>
+        </p:nvSpPr>
+        <p:spPr/>
+      </p:sp>
+      <p:sp>
+        <p:nvSpPr>
+          <p:cNvPr id="3" name="Notizenplatzhalter 2"/>
+          <p:cNvSpPr>
+            <a:spLocks noGrp="1"/>
+          </p:cNvSpPr>
+          <p:nvPr>
+            <p:ph type="body" idx="1"/>
+          </p:nvPr>
+        </p:nvSpPr>
+        <p:spPr/>
+        <p:txBody>
+          <a:bodyPr/>
+          <a:lstStyle/>
+          <a:p>
+            <a:endParaRPr lang="de-DE" dirty="0"/>
+          </a:p>
+        </p:txBody>
+      </p:sp>
+      <p:sp>
+        <p:nvSpPr>
+          <p:cNvPr id="4" name="Foliennummernplatzhalter 3"/>
+          <p:cNvSpPr>
+            <a:spLocks noGrp="1"/>
+          </p:cNvSpPr>
+          <p:nvPr>
+            <p:ph type="sldNum" sz="quarter" idx="10"/>
+          </p:nvPr>
+        </p:nvSpPr>
+        <p:spPr/>
+        <p:txBody>
+          <a:bodyPr/>
+          <a:lstStyle/>
+          <a:p>
+            <a:pPr rtl="0"/>
+            <a:fld id="{FC8BD8E7-1312-41F3-99C4-6DA5AF891969}" type="slidenum">
+              <a:rPr lang="de-DE" smtClean="0"/>
+              <a:t>8</a:t>
             </a:fld>
             <a:endParaRPr lang="de-DE" dirty="0"/>
           </a:p>
@@ -5161,7 +5247,12 @@
             <p:ph sz="half" idx="1"/>
           </p:nvPr>
         </p:nvSpPr>
-        <p:spPr/>
+        <p:spPr>
+          <a:xfrm>
+            <a:off x="1524000" y="1714500"/>
+            <a:ext cx="7853606" cy="4462272"/>
+          </a:xfrm>
+        </p:spPr>
         <p:txBody>
           <a:bodyPr/>
           <a:lstStyle/>
@@ -5177,43 +5268,66 @@
               <a:t>Nähere Angehörige</a:t>
             </a:r>
           </a:p>
-        </p:txBody>
-      </p:sp>
-      <p:pic>
-        <p:nvPicPr>
-          <p:cNvPr id="21" name="Inhaltsplatzhalter 20">
+          <a:p>
+            <a:endParaRPr lang="de-CH" dirty="0"/>
+          </a:p>
+          <a:p>
+            <a:r>
+              <a:rPr lang="de-CH" dirty="0"/>
+              <a:t>Unterstützen des med. Personals​</a:t>
+            </a:r>
+          </a:p>
+          <a:p>
+            <a:r>
+              <a:rPr lang="de-CH" dirty="0"/>
+              <a:t>Umgang mit Krankheit für Patienten und Angehörige erleichtern​</a:t>
+            </a:r>
+          </a:p>
+          <a:p>
+            <a:r>
+              <a:rPr lang="de-CH" dirty="0"/>
+              <a:t>Schweizerisches Datenschutzgesetz​</a:t>
+            </a:r>
+          </a:p>
+          <a:p>
+            <a:r>
+              <a:rPr lang="de-CH" dirty="0"/>
+              <a:t>Schweizerisches Gesundheitsgesetz​</a:t>
+            </a:r>
+          </a:p>
+          <a:p>
+            <a:r>
+              <a:rPr lang="de-CH" dirty="0"/>
+              <a:t>Usability</a:t>
+            </a:r>
+          </a:p>
+        </p:txBody>
+      </p:sp>
+      <p:sp>
+        <p:nvSpPr>
+          <p:cNvPr id="3" name="Content Placeholder 2">
             <a:extLst>
               <a:ext uri="{FF2B5EF4-FFF2-40B4-BE49-F238E27FC236}">
-                <a16:creationId xmlns:a16="http://schemas.microsoft.com/office/drawing/2014/main" id="{1C11FF07-B210-4400-BCAE-55349112FE0F}"/>
+                <a16:creationId xmlns:a16="http://schemas.microsoft.com/office/drawing/2014/main" id="{1CC2BD4A-1636-4952-B529-16E99826AD12}"/>
               </a:ext>
             </a:extLst>
           </p:cNvPr>
-          <p:cNvPicPr>
-            <a:picLocks noGrp="1" noChangeAspect="1"/>
-          </p:cNvPicPr>
+          <p:cNvSpPr>
+            <a:spLocks noGrp="1"/>
+          </p:cNvSpPr>
           <p:nvPr>
             <p:ph sz="half" idx="2"/>
           </p:nvPr>
-        </p:nvPicPr>
-        <p:blipFill>
-          <a:blip r:embed="rId3">
-            <a:extLst>
-              <a:ext uri="{28A0092B-C50C-407E-A947-70E740481C1C}">
-                <a14:useLocalDpi xmlns:a14="http://schemas.microsoft.com/office/drawing/2010/main" val="0"/>
-              </a:ext>
-            </a:extLst>
-          </a:blip>
-          <a:stretch>
-            <a:fillRect/>
-          </a:stretch>
-        </p:blipFill>
-        <p:spPr>
-          <a:xfrm>
-            <a:off x="5643693" y="1199084"/>
-            <a:ext cx="5796150" cy="4459831"/>
-          </a:xfrm>
-        </p:spPr>
-      </p:pic>
+        </p:nvSpPr>
+        <p:spPr/>
+        <p:txBody>
+          <a:bodyPr/>
+          <a:lstStyle/>
+          <a:p>
+            <a:endParaRPr lang="de-CH"/>
+          </a:p>
+        </p:txBody>
+      </p:sp>
     </p:spTree>
     <p:extLst>
       <p:ext uri="{BB962C8B-B14F-4D97-AF65-F5344CB8AC3E}">
@@ -5299,6 +5413,42 @@
           </a:p>
         </p:txBody>
       </p:sp>
+      <p:pic>
+        <p:nvPicPr>
+          <p:cNvPr id="4" name="Inhaltsplatzhalter 20">
+            <a:extLst>
+              <a:ext uri="{FF2B5EF4-FFF2-40B4-BE49-F238E27FC236}">
+                <a16:creationId xmlns:a16="http://schemas.microsoft.com/office/drawing/2014/main" id="{51C9F21F-B902-44BF-9886-5FE9E9B18183}"/>
+              </a:ext>
+            </a:extLst>
+          </p:cNvPr>
+          <p:cNvPicPr>
+            <a:picLocks noChangeAspect="1"/>
+          </p:cNvPicPr>
+          <p:nvPr/>
+        </p:nvPicPr>
+        <p:blipFill>
+          <a:blip r:embed="rId3">
+            <a:extLst>
+              <a:ext uri="{28A0092B-C50C-407E-A947-70E740481C1C}">
+                <a14:useLocalDpi xmlns:a14="http://schemas.microsoft.com/office/drawing/2010/main" val="0"/>
+              </a:ext>
+            </a:extLst>
+          </a:blip>
+          <a:stretch>
+            <a:fillRect/>
+          </a:stretch>
+        </p:blipFill>
+        <p:spPr>
+          <a:xfrm>
+            <a:off x="3688079" y="1600200"/>
+            <a:ext cx="5796150" cy="4459831"/>
+          </a:xfrm>
+          <a:prstGeom prst="rect">
+            <a:avLst/>
+          </a:prstGeom>
+        </p:spPr>
+      </p:pic>
     </p:spTree>
     <p:extLst>
       <p:ext uri="{BB962C8B-B14F-4D97-AF65-F5344CB8AC3E}">
@@ -5357,8 +5507,8 @@
           <a:lstStyle/>
           <a:p>
             <a:r>
-              <a:rPr lang="de-CH" dirty="0" err="1"/>
-              <a:t>Synthesize</a:t>
+              <a:rPr lang="de-CH" dirty="0"/>
+              <a:t>Research</a:t>
             </a:r>
             <a:endParaRPr lang="de-DE" dirty="0"/>
           </a:p>
@@ -5379,28 +5529,7 @@
           <a:bodyPr rtlCol="0"/>
           <a:lstStyle/>
           <a:p>
-            <a:r>
-              <a:rPr lang="de-CH" dirty="0"/>
-              <a:t>Als Vater will ich einen einfachen Weg das Verhalten des Patienten zu dokumentieren, damit der Arzt/Therapeut die Informationen benutzen kann, um die Behandlung entsprechend anzupassen.</a:t>
-            </a:r>
-          </a:p>
-          <a:p>
-            <a:r>
-              <a:rPr lang="de-CH" dirty="0"/>
-              <a:t>Als Vormund will ich Zugriff auf den Behandlungsverlauf des Patienten, damit ich weiss wie gut er sich entwickelt.</a:t>
-            </a:r>
-          </a:p>
-          <a:p>
-            <a:r>
-              <a:rPr lang="de-CH" dirty="0"/>
-              <a:t>Als Mutter will ich die verschriebenen Medikamente jeder Sitzung sehen, damit ich sicherstellen kann, dass der Patient diese auch benutzt.</a:t>
-            </a:r>
-          </a:p>
-          <a:p>
-            <a:r>
-              <a:rPr lang="de-CH" dirty="0"/>
-              <a:t>Als Angehöriger will ich die gesetzten Ziele zwischen dem Arzt/Therapeuten und dem Patienten sehen und in der Lage sein, eigene Ziele ins System einzutragen, damit der Arzt/Therapeut und ich diese, wenn nötig, anpassen und überprüfen können.</a:t>
-            </a:r>
+            <a:pPr rtl="0"/>
             <a:endParaRPr lang="de-DE" dirty="0"/>
           </a:p>
         </p:txBody>
@@ -5408,7 +5537,7 @@
     </p:spTree>
     <p:extLst>
       <p:ext uri="{BB962C8B-B14F-4D97-AF65-F5344CB8AC3E}">
-        <p14:creationId xmlns:p14="http://schemas.microsoft.com/office/powerpoint/2010/main" val="817366907"/>
+        <p14:creationId xmlns:p14="http://schemas.microsoft.com/office/powerpoint/2010/main" val="1886595265"/>
       </p:ext>
     </p:extLst>
   </p:cSld>
@@ -5463,67 +5592,58 @@
           <a:lstStyle/>
           <a:p>
             <a:r>
+              <a:rPr lang="de-CH" dirty="0" err="1"/>
+              <a:t>Synthesize</a:t>
+            </a:r>
+            <a:endParaRPr lang="de-DE" dirty="0"/>
+          </a:p>
+        </p:txBody>
+      </p:sp>
+      <p:sp>
+        <p:nvSpPr>
+          <p:cNvPr id="3" name="Inhaltsplatzhalter 2"/>
+          <p:cNvSpPr>
+            <a:spLocks noGrp="1"/>
+          </p:cNvSpPr>
+          <p:nvPr>
+            <p:ph idx="1"/>
+          </p:nvPr>
+        </p:nvSpPr>
+        <p:spPr/>
+        <p:txBody>
+          <a:bodyPr rtlCol="0"/>
+          <a:lstStyle/>
+          <a:p>
+            <a:r>
               <a:rPr lang="de-CH" dirty="0"/>
-              <a:t>Design</a:t>
-            </a:r>
-            <a:endParaRPr lang="de-DE" dirty="0"/>
-          </a:p>
-        </p:txBody>
-      </p:sp>
-      <p:sp>
-        <p:nvSpPr>
-          <p:cNvPr id="4" name="Inhaltsplatzhalter 3">
-            <a:extLst>
-              <a:ext uri="{FF2B5EF4-FFF2-40B4-BE49-F238E27FC236}">
-                <a16:creationId xmlns:a16="http://schemas.microsoft.com/office/drawing/2014/main" id="{06E420E6-FF46-43CB-A7C0-AE50FF6BF079}"/>
-              </a:ext>
-            </a:extLst>
-          </p:cNvPr>
-          <p:cNvSpPr>
-            <a:spLocks noGrp="1"/>
-          </p:cNvSpPr>
-          <p:nvPr>
-            <p:ph sz="half" idx="1"/>
-          </p:nvPr>
-        </p:nvSpPr>
-        <p:spPr/>
-        <p:txBody>
-          <a:bodyPr/>
-          <a:lstStyle/>
-          <a:p>
-            <a:endParaRPr lang="de-CH" dirty="0"/>
-          </a:p>
-        </p:txBody>
-      </p:sp>
-      <p:sp>
-        <p:nvSpPr>
-          <p:cNvPr id="5" name="Inhaltsplatzhalter 4">
-            <a:extLst>
-              <a:ext uri="{FF2B5EF4-FFF2-40B4-BE49-F238E27FC236}">
-                <a16:creationId xmlns:a16="http://schemas.microsoft.com/office/drawing/2014/main" id="{BD077E71-550D-4CF0-8598-FB270BCFBA53}"/>
-              </a:ext>
-            </a:extLst>
-          </p:cNvPr>
-          <p:cNvSpPr>
-            <a:spLocks noGrp="1"/>
-          </p:cNvSpPr>
-          <p:nvPr>
-            <p:ph sz="half" idx="2"/>
-          </p:nvPr>
-        </p:nvSpPr>
-        <p:spPr/>
-        <p:txBody>
-          <a:bodyPr/>
-          <a:lstStyle/>
-          <a:p>
-            <a:endParaRPr lang="de-CH"/>
+              <a:t>Als Vater will ich einen einfachen Weg das Verhalten des Patienten zu dokumentieren, damit der Arzt/Therapeut die Informationen benutzen kann, um die Behandlung entsprechend anzupassen.</a:t>
+            </a:r>
+          </a:p>
+          <a:p>
+            <a:r>
+              <a:rPr lang="de-CH" dirty="0"/>
+              <a:t>Als Vormund will ich Zugriff auf den Behandlungsverlauf des Patienten, damit ich weiss wie gut er sich entwickelt.</a:t>
+            </a:r>
+          </a:p>
+          <a:p>
+            <a:r>
+              <a:rPr lang="de-CH" dirty="0"/>
+              <a:t>Als Mutter will ich die verschriebenen Medikamente jeder Sitzung sehen, damit ich sicherstellen kann, dass der Patient diese auch benutzt.</a:t>
+            </a:r>
+          </a:p>
+          <a:p>
+            <a:r>
+              <a:rPr lang="de-CH" dirty="0"/>
+              <a:t>Als Angehöriger will ich die gesetzten Ziele zwischen dem Arzt/Therapeuten und dem Patienten sehen und in der Lage sein, eigene Ziele ins System einzutragen, damit der Arzt/Therapeut und ich diese, wenn nötig, anpassen und überprüfen können.</a:t>
+            </a:r>
+            <a:endParaRPr lang="de-DE" dirty="0"/>
           </a:p>
         </p:txBody>
       </p:sp>
     </p:spTree>
     <p:extLst>
       <p:ext uri="{BB962C8B-B14F-4D97-AF65-F5344CB8AC3E}">
-        <p14:creationId xmlns:p14="http://schemas.microsoft.com/office/powerpoint/2010/main" val="3956006338"/>
+        <p14:creationId xmlns:p14="http://schemas.microsoft.com/office/powerpoint/2010/main" val="817366907"/>
       </p:ext>
     </p:extLst>
   </p:cSld>
@@ -5579,36 +5699,66 @@
           <a:p>
             <a:r>
               <a:rPr lang="de-CH" dirty="0"/>
-              <a:t>Prototype</a:t>
-            </a:r>
-            <a:endParaRPr lang="de-DE" dirty="0"/>
-          </a:p>
-        </p:txBody>
-      </p:sp>
-      <p:sp>
-        <p:nvSpPr>
-          <p:cNvPr id="3" name="Inhaltsplatzhalter 2"/>
-          <p:cNvSpPr>
-            <a:spLocks noGrp="1"/>
-          </p:cNvSpPr>
-          <p:nvPr>
-            <p:ph idx="1"/>
+              <a:t>Design</a:t>
+            </a:r>
+            <a:endParaRPr lang="de-DE" dirty="0"/>
+          </a:p>
+        </p:txBody>
+      </p:sp>
+      <p:sp>
+        <p:nvSpPr>
+          <p:cNvPr id="4" name="Inhaltsplatzhalter 3">
+            <a:extLst>
+              <a:ext uri="{FF2B5EF4-FFF2-40B4-BE49-F238E27FC236}">
+                <a16:creationId xmlns:a16="http://schemas.microsoft.com/office/drawing/2014/main" id="{06E420E6-FF46-43CB-A7C0-AE50FF6BF079}"/>
+              </a:ext>
+            </a:extLst>
+          </p:cNvPr>
+          <p:cNvSpPr>
+            <a:spLocks noGrp="1"/>
+          </p:cNvSpPr>
+          <p:nvPr>
+            <p:ph sz="half" idx="1"/>
           </p:nvPr>
         </p:nvSpPr>
         <p:spPr/>
         <p:txBody>
-          <a:bodyPr rtlCol="0"/>
-          <a:lstStyle/>
-          <a:p>
-            <a:pPr rtl="0"/>
-            <a:endParaRPr lang="de-DE" dirty="0"/>
+          <a:bodyPr/>
+          <a:lstStyle/>
+          <a:p>
+            <a:endParaRPr lang="de-CH" dirty="0"/>
+          </a:p>
+        </p:txBody>
+      </p:sp>
+      <p:sp>
+        <p:nvSpPr>
+          <p:cNvPr id="5" name="Inhaltsplatzhalter 4">
+            <a:extLst>
+              <a:ext uri="{FF2B5EF4-FFF2-40B4-BE49-F238E27FC236}">
+                <a16:creationId xmlns:a16="http://schemas.microsoft.com/office/drawing/2014/main" id="{BD077E71-550D-4CF0-8598-FB270BCFBA53}"/>
+              </a:ext>
+            </a:extLst>
+          </p:cNvPr>
+          <p:cNvSpPr>
+            <a:spLocks noGrp="1"/>
+          </p:cNvSpPr>
+          <p:nvPr>
+            <p:ph sz="half" idx="2"/>
+          </p:nvPr>
+        </p:nvSpPr>
+        <p:spPr/>
+        <p:txBody>
+          <a:bodyPr/>
+          <a:lstStyle/>
+          <a:p>
+            <a:endParaRPr lang="de-CH"/>
           </a:p>
         </p:txBody>
       </p:sp>
     </p:spTree>
     <p:extLst>
       <p:ext uri="{BB962C8B-B14F-4D97-AF65-F5344CB8AC3E}">
-        <p14:creationId xmlns:p14="http://schemas.microsoft.com/office/powerpoint/2010/main" val="1488274883"/>
+        <p14:creationId xmlns:p14="http://schemas.microsoft.com/office/powerpoint/2010/main" val="3956006338"/>
       </p:ext>
     </p:extLst>
   </p:cSld>
@@ -5663,6 +5813,91 @@
           <a:lstStyle/>
           <a:p>
             <a:r>
+              <a:rPr lang="de-CH" dirty="0"/>
+              <a:t>Prototype</a:t>
+            </a:r>
+            <a:endParaRPr lang="de-DE" dirty="0"/>
+          </a:p>
+        </p:txBody>
+      </p:sp>
+      <p:sp>
+        <p:nvSpPr>
+          <p:cNvPr id="3" name="Inhaltsplatzhalter 2"/>
+          <p:cNvSpPr>
+            <a:spLocks noGrp="1"/>
+          </p:cNvSpPr>
+          <p:nvPr>
+            <p:ph idx="1"/>
+          </p:nvPr>
+        </p:nvSpPr>
+        <p:spPr/>
+        <p:txBody>
+          <a:bodyPr rtlCol="0"/>
+          <a:lstStyle/>
+          <a:p>
+            <a:pPr rtl="0"/>
+            <a:endParaRPr lang="de-DE" dirty="0"/>
+          </a:p>
+        </p:txBody>
+      </p:sp>
+    </p:spTree>
+    <p:extLst>
+      <p:ext uri="{BB962C8B-B14F-4D97-AF65-F5344CB8AC3E}">
+        <p14:creationId xmlns:p14="http://schemas.microsoft.com/office/powerpoint/2010/main" val="1488274883"/>
+      </p:ext>
+    </p:extLst>
+  </p:cSld>
+  <p:clrMapOvr>
+    <a:masterClrMapping/>
+  </p:clrMapOvr>
+  <mc:AlternateContent xmlns:mc="http://schemas.openxmlformats.org/markup-compatibility/2006" xmlns:p14="http://schemas.microsoft.com/office/powerpoint/2010/main">
+    <mc:Choice Requires="p14">
+      <p:transition spd="med" p14:dur="700">
+        <p:fade/>
+      </p:transition>
+    </mc:Choice>
+    <mc:Fallback xmlns="">
+      <p:transition spd="med">
+        <p:fade/>
+      </p:transition>
+    </mc:Fallback>
+  </mc:AlternateContent>
+</p:sld>
+</file>
+
+<file path=ppt/slides/slide8.xml><?xml version="1.0" encoding="utf-8"?>
+<p:sld xmlns:a="http://schemas.openxmlformats.org/drawingml/2006/main" xmlns:r="http://schemas.openxmlformats.org/officeDocument/2006/relationships" xmlns:p="http://schemas.openxmlformats.org/presentationml/2006/main">
+  <p:cSld>
+    <p:spTree>
+      <p:nvGrpSpPr>
+        <p:cNvPr id="1" name=""/>
+        <p:cNvGrpSpPr/>
+        <p:nvPr/>
+      </p:nvGrpSpPr>
+      <p:grpSpPr>
+        <a:xfrm>
+          <a:off x="0" y="0"/>
+          <a:ext cx="0" cy="0"/>
+          <a:chOff x="0" y="0"/>
+          <a:chExt cx="0" cy="0"/>
+        </a:xfrm>
+      </p:grpSpPr>
+      <p:sp>
+        <p:nvSpPr>
+          <p:cNvPr id="2" name="Titel 1"/>
+          <p:cNvSpPr>
+            <a:spLocks noGrp="1"/>
+          </p:cNvSpPr>
+          <p:nvPr>
+            <p:ph type="title"/>
+          </p:nvPr>
+        </p:nvSpPr>
+        <p:spPr/>
+        <p:txBody>
+          <a:bodyPr rtlCol="0"/>
+          <a:lstStyle/>
+          <a:p>
+            <a:r>
               <a:rPr lang="de-CH" dirty="0" err="1"/>
               <a:t>Validate</a:t>
             </a:r>
@@ -5715,7 +5950,7 @@
 </p:sld>
 </file>
 
-<file path=ppt/slides/slide8.xml><?xml version="1.0" encoding="utf-8"?>
+<file path=ppt/slides/slide9.xml><?xml version="1.0" encoding="utf-8"?>
 <p:sld xmlns:a="http://schemas.openxmlformats.org/drawingml/2006/main" xmlns:r="http://schemas.openxmlformats.org/officeDocument/2006/relationships" xmlns:p="http://schemas.openxmlformats.org/presentationml/2006/main">
   <p:cSld>
     <p:spTree>

</xml_diff>

<commit_message>
Add Validation to doc & pres
</commit_message>
<xml_diff>
--- a/doc/Presentation.pptx
+++ b/doc/Presentation.pptx
@@ -25,7 +25,7 @@
   <p:notesSz cx="6858000" cy="9144000"/>
   <p:defaultTextStyle>
     <a:defPPr rtl="0">
-      <a:defRPr lang="de-de"/>
+      <a:defRPr lang="x-none"/>
     </a:defPPr>
     <a:lvl1pPr marL="0" algn="l" defTabSz="914400" rtl="0" eaLnBrk="1" latinLnBrk="0" hangingPunct="1">
       <a:defRPr sz="1800" kern="1200">
@@ -224,7 +224,7 @@
             <a:pPr rtl="0"/>
             <a:fld id="{960672BD-261C-4EDC-9C5E-C246835120E7}" type="datetime1">
               <a:rPr lang="de-DE" smtClean="0"/>
-              <a:t>08.04.2018</a:t>
+              <a:t>08.04.18</a:t>
             </a:fld>
             <a:endParaRPr lang="de-DE" dirty="0"/>
           </a:p>
@@ -394,7 +394,7 @@
             <a:pPr rtl="0"/>
             <a:fld id="{6B5664F4-ABD2-4F09-9758-D36145E15169}" type="datetime1">
               <a:rPr lang="de-DE" smtClean="0"/>
-              <a:t>08.04.2018</a:t>
+              <a:t>08.04.18</a:t>
             </a:fld>
             <a:endParaRPr lang="de-DE" dirty="0"/>
           </a:p>
@@ -1965,7 +1965,7 @@
             <a:pPr rtl="0"/>
             <a:fld id="{6D86D372-411D-4B4E-9C3F-27EFF2F8BE1E}" type="datetime1">
               <a:rPr lang="de-DE" smtClean="0"/>
-              <a:t>08.04.2018</a:t>
+              <a:t>08.04.18</a:t>
             </a:fld>
             <a:endParaRPr lang="de-DE" dirty="0"/>
           </a:p>
@@ -2172,7 +2172,7 @@
             <a:pPr rtl="0"/>
             <a:fld id="{E326EB1D-CBBF-438D-A188-239583155CD5}" type="datetime1">
               <a:rPr lang="de-DE" smtClean="0"/>
-              <a:t>08.04.2018</a:t>
+              <a:t>08.04.18</a:t>
             </a:fld>
             <a:endParaRPr lang="de-DE" dirty="0"/>
           </a:p>
@@ -2782,7 +2782,7 @@
             <a:pPr rtl="0"/>
             <a:fld id="{0158FB9A-9055-4D91-A8D6-422B1A47ADD6}" type="datetime1">
               <a:rPr lang="de-DE" smtClean="0"/>
-              <a:t>08.04.2018</a:t>
+              <a:t>08.04.18</a:t>
             </a:fld>
             <a:endParaRPr lang="de-DE" dirty="0"/>
           </a:p>
@@ -3305,7 +3305,7 @@
             <a:pPr rtl="0"/>
             <a:fld id="{F3AD2B2A-001E-4204-A9F7-ADB62FDFB3C2}" type="datetime1">
               <a:rPr lang="de-DE" smtClean="0"/>
-              <a:t>08.04.2018</a:t>
+              <a:t>08.04.18</a:t>
             </a:fld>
             <a:endParaRPr lang="de-DE" dirty="0"/>
           </a:p>
@@ -3763,7 +3763,7 @@
             <a:pPr rtl="0"/>
             <a:fld id="{D0598511-F564-4313-9C85-1BB6BF3D8A32}" type="datetime1">
               <a:rPr lang="de-DE" smtClean="0"/>
-              <a:t>08.04.2018</a:t>
+              <a:t>08.04.18</a:t>
             </a:fld>
             <a:endParaRPr lang="de-DE" dirty="0"/>
           </a:p>
@@ -3901,7 +3901,7 @@
             <a:pPr rtl="0"/>
             <a:fld id="{2E8B8011-CBA9-4FB0-934D-C2F23F0053DB}" type="datetime1">
               <a:rPr lang="de-DE" smtClean="0"/>
-              <a:t>08.04.2018</a:t>
+              <a:t>08.04.18</a:t>
             </a:fld>
             <a:endParaRPr lang="de-DE" dirty="0"/>
           </a:p>
@@ -4247,7 +4247,7 @@
             <a:pPr rtl="0"/>
             <a:fld id="{62C0A95F-FFB2-4410-A448-2C54BE7723F4}" type="datetime1">
               <a:rPr lang="de-DE" smtClean="0"/>
-              <a:t>08.04.2018</a:t>
+              <a:t>08.04.18</a:t>
             </a:fld>
             <a:endParaRPr lang="de-DE" dirty="0"/>
           </a:p>
@@ -4541,7 +4541,7 @@
             <a:pPr rtl="0"/>
             <a:fld id="{8C96ADC6-BDC4-42FB-97FB-DA73ECD9CEE8}" type="datetime1">
               <a:rPr lang="de-DE" smtClean="0"/>
-              <a:t>08.04.2018</a:t>
+              <a:t>08.04.18</a:t>
             </a:fld>
             <a:endParaRPr lang="de-DE" dirty="0"/>
           </a:p>
@@ -5068,7 +5068,7 @@
           <p:cNvPr id="10" name="Bildplatzhalter 9">
             <a:extLst>
               <a:ext uri="{FF2B5EF4-FFF2-40B4-BE49-F238E27FC236}">
-                <a16:creationId xmlns:a16="http://schemas.microsoft.com/office/drawing/2014/main" id="{C29F7C63-F3E3-44C4-851B-F7913AA9706D}"/>
+                <a16:creationId xmlns:a16="http://schemas.microsoft.com/office/drawing/2014/main" xmlns="" id="{C29F7C63-F3E3-44C4-851B-F7913AA9706D}"/>
               </a:ext>
             </a:extLst>
           </p:cNvPr>
@@ -5102,7 +5102,7 @@
           <p:cNvPr id="14" name="Bildplatzhalter 13">
             <a:extLst>
               <a:ext uri="{FF2B5EF4-FFF2-40B4-BE49-F238E27FC236}">
-                <a16:creationId xmlns:a16="http://schemas.microsoft.com/office/drawing/2014/main" id="{A340DC10-DD9A-4562-AAFD-3AD5F391991D}"/>
+                <a16:creationId xmlns:a16="http://schemas.microsoft.com/office/drawing/2014/main" xmlns="" id="{A340DC10-DD9A-4562-AAFD-3AD5F391991D}"/>
               </a:ext>
             </a:extLst>
           </p:cNvPr>
@@ -5136,7 +5136,7 @@
           <p:cNvPr id="18" name="Bildplatzhalter 17">
             <a:extLst>
               <a:ext uri="{FF2B5EF4-FFF2-40B4-BE49-F238E27FC236}">
-                <a16:creationId xmlns:a16="http://schemas.microsoft.com/office/drawing/2014/main" id="{40F64AC5-1EA3-4330-9CA7-B95506CD16D4}"/>
+                <a16:creationId xmlns:a16="http://schemas.microsoft.com/office/drawing/2014/main" xmlns="" id="{40F64AC5-1EA3-4330-9CA7-B95506CD16D4}"/>
               </a:ext>
             </a:extLst>
           </p:cNvPr>
@@ -5236,7 +5236,7 @@
           <p:cNvPr id="18" name="Inhaltsplatzhalter 17">
             <a:extLst>
               <a:ext uri="{FF2B5EF4-FFF2-40B4-BE49-F238E27FC236}">
-                <a16:creationId xmlns:a16="http://schemas.microsoft.com/office/drawing/2014/main" id="{0C719E4D-A698-413D-BA3C-5FAB44B613F4}"/>
+                <a16:creationId xmlns:a16="http://schemas.microsoft.com/office/drawing/2014/main" xmlns="" id="{0C719E4D-A698-413D-BA3C-5FAB44B613F4}"/>
               </a:ext>
             </a:extLst>
           </p:cNvPr>
@@ -5308,7 +5308,7 @@
           <p:cNvPr id="3" name="Content Placeholder 2">
             <a:extLst>
               <a:ext uri="{FF2B5EF4-FFF2-40B4-BE49-F238E27FC236}">
-                <a16:creationId xmlns:a16="http://schemas.microsoft.com/office/drawing/2014/main" id="{1CC2BD4A-1636-4952-B529-16E99826AD12}"/>
+                <a16:creationId xmlns:a16="http://schemas.microsoft.com/office/drawing/2014/main" xmlns="" id="{1CC2BD4A-1636-4952-B529-16E99826AD12}"/>
               </a:ext>
             </a:extLst>
           </p:cNvPr>
@@ -5418,7 +5418,7 @@
           <p:cNvPr id="4" name="Inhaltsplatzhalter 20">
             <a:extLst>
               <a:ext uri="{FF2B5EF4-FFF2-40B4-BE49-F238E27FC236}">
-                <a16:creationId xmlns:a16="http://schemas.microsoft.com/office/drawing/2014/main" id="{51C9F21F-B902-44BF-9886-5FE9E9B18183}"/>
+                <a16:creationId xmlns:a16="http://schemas.microsoft.com/office/drawing/2014/main" xmlns="" id="{51C9F21F-B902-44BF-9886-5FE9E9B18183}"/>
               </a:ext>
             </a:extLst>
           </p:cNvPr>
@@ -5710,7 +5710,7 @@
           <p:cNvPr id="4" name="Inhaltsplatzhalter 3">
             <a:extLst>
               <a:ext uri="{FF2B5EF4-FFF2-40B4-BE49-F238E27FC236}">
-                <a16:creationId xmlns:a16="http://schemas.microsoft.com/office/drawing/2014/main" id="{06E420E6-FF46-43CB-A7C0-AE50FF6BF079}"/>
+                <a16:creationId xmlns:a16="http://schemas.microsoft.com/office/drawing/2014/main" xmlns="" id="{06E420E6-FF46-43CB-A7C0-AE50FF6BF079}"/>
               </a:ext>
             </a:extLst>
           </p:cNvPr>
@@ -5735,7 +5735,7 @@
           <p:cNvPr id="5" name="Inhaltsplatzhalter 4">
             <a:extLst>
               <a:ext uri="{FF2B5EF4-FFF2-40B4-BE49-F238E27FC236}">
-                <a16:creationId xmlns:a16="http://schemas.microsoft.com/office/drawing/2014/main" id="{BD077E71-550D-4CF0-8598-FB270BCFBA53}"/>
+                <a16:creationId xmlns:a16="http://schemas.microsoft.com/office/drawing/2014/main" xmlns="" id="{BD077E71-550D-4CF0-8598-FB270BCFBA53}"/>
               </a:ext>
             </a:extLst>
           </p:cNvPr>
@@ -5917,14 +5917,157 @@
         </p:nvSpPr>
         <p:spPr/>
         <p:txBody>
-          <a:bodyPr rtlCol="0"/>
+          <a:bodyPr rtlCol="0">
+            <a:normAutofit fontScale="85000" lnSpcReduction="20000"/>
+          </a:bodyPr>
           <a:lstStyle/>
           <a:p>
             <a:pPr rtl="0"/>
-            <a:endParaRPr lang="de-DE" dirty="0"/>
-          </a:p>
-        </p:txBody>
-      </p:sp>
+            <a:r>
+              <a:rPr lang="de-DE" dirty="0" smtClean="0"/>
+              <a:t>Validation</a:t>
+            </a:r>
+          </a:p>
+          <a:p>
+            <a:pPr lvl="1"/>
+            <a:r>
+              <a:rPr lang="de-CH" dirty="0"/>
+              <a:t>Wie ist Ihr erster Eindruck von den Prototypen?</a:t>
+            </a:r>
+            <a:endParaRPr lang="en-GB" dirty="0"/>
+          </a:p>
+          <a:p>
+            <a:pPr lvl="1"/>
+            <a:r>
+              <a:rPr lang="de-CH" dirty="0"/>
+              <a:t>Was würden Sie unbedingt verbessern?</a:t>
+            </a:r>
+            <a:endParaRPr lang="en-GB" dirty="0"/>
+          </a:p>
+          <a:p>
+            <a:pPr lvl="1"/>
+            <a:r>
+              <a:rPr lang="de-CH" dirty="0"/>
+              <a:t>Was finden Sie gut?</a:t>
+            </a:r>
+            <a:endParaRPr lang="en-GB" dirty="0"/>
+          </a:p>
+          <a:p>
+            <a:pPr lvl="1"/>
+            <a:r>
+              <a:rPr lang="de-CH" dirty="0"/>
+              <a:t>Hätten Sie was anderes erwartet?</a:t>
+            </a:r>
+            <a:endParaRPr lang="en-GB" dirty="0"/>
+          </a:p>
+          <a:p>
+            <a:pPr lvl="1"/>
+            <a:r>
+              <a:rPr lang="de-CH" dirty="0"/>
+              <a:t>Welcher der drei Prototypen ist ihr Favorit</a:t>
+            </a:r>
+            <a:r>
+              <a:rPr lang="de-CH" dirty="0" smtClean="0"/>
+              <a:t>?</a:t>
+            </a:r>
+            <a:endParaRPr lang="de-DE" dirty="0" smtClean="0"/>
+          </a:p>
+          <a:p>
+            <a:pPr marL="274320" lvl="1">
+              <a:spcBef>
+                <a:spcPts val="1800"/>
+              </a:spcBef>
+            </a:pPr>
+            <a:endParaRPr lang="de-CH" sz="2000" dirty="0" smtClean="0"/>
+          </a:p>
+          <a:p>
+            <a:pPr marL="274320" lvl="1">
+              <a:spcBef>
+                <a:spcPts val="1800"/>
+              </a:spcBef>
+            </a:pPr>
+            <a:r>
+              <a:rPr lang="de-CH" sz="2000" dirty="0" smtClean="0"/>
+              <a:t>Relevante Aussagen</a:t>
+            </a:r>
+          </a:p>
+          <a:p>
+            <a:pPr marL="594360" lvl="2">
+              <a:spcBef>
+                <a:spcPts val="1800"/>
+              </a:spcBef>
+            </a:pPr>
+            <a:r>
+              <a:rPr lang="de-CH" dirty="0"/>
+              <a:t>«Der Prototyp wirkt sehr sauber und übersichtlich»</a:t>
+            </a:r>
+            <a:endParaRPr lang="en-GB" dirty="0"/>
+          </a:p>
+          <a:p>
+            <a:pPr marL="594360" lvl="2">
+              <a:spcBef>
+                <a:spcPts val="1800"/>
+              </a:spcBef>
+            </a:pPr>
+            <a:r>
+              <a:rPr lang="de-CH" dirty="0"/>
+              <a:t>«Das Login sollte noch Informationen zur Software enthalten</a:t>
+            </a:r>
+            <a:r>
+              <a:rPr lang="de-CH" dirty="0" smtClean="0"/>
+              <a:t>»</a:t>
+            </a:r>
+            <a:endParaRPr lang="de-DE" dirty="0" smtClean="0"/>
+          </a:p>
+          <a:p>
+            <a:pPr marL="274320" lvl="1">
+              <a:spcBef>
+                <a:spcPts val="1800"/>
+              </a:spcBef>
+            </a:pPr>
+            <a:endParaRPr lang="de-CH" dirty="0"/>
+          </a:p>
+          <a:p>
+            <a:pPr rtl="0"/>
+            <a:r>
+              <a:rPr lang="de-DE" dirty="0" smtClean="0"/>
+              <a:t>Resultate </a:t>
+            </a:r>
+          </a:p>
+          <a:p>
+            <a:pPr lvl="1"/>
+            <a:r>
+              <a:rPr lang="de-DE" dirty="0" smtClean="0"/>
+              <a:t>Klar und verständlich</a:t>
+            </a:r>
+            <a:endParaRPr lang="de-DE" dirty="0" smtClean="0"/>
+          </a:p>
+        </p:txBody>
+      </p:sp>
+      <p:pic>
+        <p:nvPicPr>
+          <p:cNvPr id="6" name="Picture 5"/>
+          <p:cNvPicPr>
+            <a:picLocks noChangeAspect="1"/>
+          </p:cNvPicPr>
+          <p:nvPr/>
+        </p:nvPicPr>
+        <p:blipFill>
+          <a:blip r:embed="rId3"/>
+          <a:stretch>
+            <a:fillRect/>
+          </a:stretch>
+        </p:blipFill>
+        <p:spPr>
+          <a:xfrm>
+            <a:off x="7887854" y="893379"/>
+            <a:ext cx="4116846" cy="3505200"/>
+          </a:xfrm>
+          <a:prstGeom prst="rect">
+            <a:avLst/>
+          </a:prstGeom>
+        </p:spPr>
+      </p:pic>
     </p:spTree>
     <p:extLst>
       <p:ext uri="{BB962C8B-B14F-4D97-AF65-F5344CB8AC3E}">
@@ -5972,7 +6115,7 @@
           <p:cNvPr id="4" name="Titel 3">
             <a:extLst>
               <a:ext uri="{FF2B5EF4-FFF2-40B4-BE49-F238E27FC236}">
-                <a16:creationId xmlns:a16="http://schemas.microsoft.com/office/drawing/2014/main" id="{5ADCBB27-4A02-4FE6-B1B3-EBDF20E85236}"/>
+                <a16:creationId xmlns:a16="http://schemas.microsoft.com/office/drawing/2014/main" xmlns="" id="{5ADCBB27-4A02-4FE6-B1B3-EBDF20E85236}"/>
               </a:ext>
             </a:extLst>
           </p:cNvPr>
@@ -6001,7 +6144,7 @@
           <p:cNvPr id="5" name="Textplatzhalter 4">
             <a:extLst>
               <a:ext uri="{FF2B5EF4-FFF2-40B4-BE49-F238E27FC236}">
-                <a16:creationId xmlns:a16="http://schemas.microsoft.com/office/drawing/2014/main" id="{2511E126-4429-475A-915A-4B265D5F381B}"/>
+                <a16:creationId xmlns:a16="http://schemas.microsoft.com/office/drawing/2014/main" xmlns="" id="{2511E126-4429-475A-915A-4B265D5F381B}"/>
               </a:ext>
             </a:extLst>
           </p:cNvPr>

</xml_diff>